<commit_message>
update to slides and notebooks
</commit_message>
<xml_diff>
--- a/instructors/06-being-precise_v2.0.pptx
+++ b/instructors/06-being-precise_v2.0.pptx
@@ -5,7 +5,7 @@
     <p:sldMasterId id="2147483648" r:id="rId1"/>
   </p:sldMasterIdLst>
   <p:notesMasterIdLst>
-    <p:notesMasterId r:id="rId20"/>
+    <p:notesMasterId r:id="rId22"/>
   </p:notesMasterIdLst>
   <p:sldIdLst>
     <p:sldId id="256" r:id="rId2"/>
@@ -26,6 +26,8 @@
     <p:sldId id="287" r:id="rId17"/>
     <p:sldId id="290" r:id="rId18"/>
     <p:sldId id="289" r:id="rId19"/>
+    <p:sldId id="291" r:id="rId20"/>
+    <p:sldId id="292" r:id="rId21"/>
   </p:sldIdLst>
   <p:sldSz cx="12192000" cy="6858000"/>
   <p:notesSz cx="6858000" cy="9144000"/>
@@ -3873,6 +3875,90 @@
 </p:notes>
 </file>
 
+<file path=ppt/notesSlides/notesSlide16.xml><?xml version="1.0" encoding="utf-8"?>
+<p:notes xmlns:a="http://schemas.openxmlformats.org/drawingml/2006/main" xmlns:r="http://schemas.openxmlformats.org/officeDocument/2006/relationships" xmlns:p="http://schemas.openxmlformats.org/presentationml/2006/main">
+  <p:cSld>
+    <p:spTree>
+      <p:nvGrpSpPr>
+        <p:cNvPr id="1" name=""/>
+        <p:cNvGrpSpPr/>
+        <p:nvPr/>
+      </p:nvGrpSpPr>
+      <p:grpSpPr>
+        <a:xfrm>
+          <a:off x="0" y="0"/>
+          <a:ext cx="0" cy="0"/>
+          <a:chOff x="0" y="0"/>
+          <a:chExt cx="0" cy="0"/>
+        </a:xfrm>
+      </p:grpSpPr>
+      <p:sp>
+        <p:nvSpPr>
+          <p:cNvPr id="2" name="Slide Image Placeholder 1"/>
+          <p:cNvSpPr>
+            <a:spLocks noGrp="1" noRot="1" noChangeAspect="1"/>
+          </p:cNvSpPr>
+          <p:nvPr>
+            <p:ph type="sldImg"/>
+          </p:nvPr>
+        </p:nvSpPr>
+        <p:spPr/>
+      </p:sp>
+      <p:sp>
+        <p:nvSpPr>
+          <p:cNvPr id="3" name="Notes Placeholder 2"/>
+          <p:cNvSpPr>
+            <a:spLocks noGrp="1"/>
+          </p:cNvSpPr>
+          <p:nvPr>
+            <p:ph type="body" idx="1"/>
+          </p:nvPr>
+        </p:nvSpPr>
+        <p:spPr/>
+        <p:txBody>
+          <a:bodyPr/>
+          <a:lstStyle/>
+          <a:p>
+            <a:endParaRPr lang="en-GB" dirty="0"/>
+          </a:p>
+        </p:txBody>
+      </p:sp>
+      <p:sp>
+        <p:nvSpPr>
+          <p:cNvPr id="4" name="Slide Number Placeholder 3"/>
+          <p:cNvSpPr>
+            <a:spLocks noGrp="1"/>
+          </p:cNvSpPr>
+          <p:nvPr>
+            <p:ph type="sldNum" sz="quarter" idx="10"/>
+          </p:nvPr>
+        </p:nvSpPr>
+        <p:spPr/>
+        <p:txBody>
+          <a:bodyPr/>
+          <a:lstStyle/>
+          <a:p>
+            <a:fld id="{CCB04583-82FC-EB4C-9DD9-0626DE3C6BC2}" type="slidenum">
+              <a:rPr lang="en-GB" smtClean="0"/>
+              <a:t>19</a:t>
+            </a:fld>
+            <a:endParaRPr lang="en-GB"/>
+          </a:p>
+        </p:txBody>
+      </p:sp>
+    </p:spTree>
+    <p:extLst>
+      <p:ext uri="{BB962C8B-B14F-4D97-AF65-F5344CB8AC3E}">
+        <p14:creationId xmlns:p14="http://schemas.microsoft.com/office/powerpoint/2010/main" val="69533663"/>
+      </p:ext>
+    </p:extLst>
+  </p:cSld>
+  <p:clrMapOvr>
+    <a:masterClrMapping/>
+  </p:clrMapOvr>
+</p:notes>
+</file>
+
 <file path=ppt/notesSlides/notesSlide2.xml><?xml version="1.0" encoding="utf-8"?>
 <p:notes xmlns:a="http://schemas.openxmlformats.org/drawingml/2006/main" xmlns:r="http://schemas.openxmlformats.org/officeDocument/2006/relationships" xmlns:p="http://schemas.openxmlformats.org/presentationml/2006/main">
   <p:cSld>
@@ -12519,6 +12605,228 @@
 </p:sld>
 </file>
 
+<file path=ppt/slides/slide19.xml><?xml version="1.0" encoding="utf-8"?>
+<p:sld xmlns:a="http://schemas.openxmlformats.org/drawingml/2006/main" xmlns:r="http://schemas.openxmlformats.org/officeDocument/2006/relationships" xmlns:p="http://schemas.openxmlformats.org/presentationml/2006/main">
+  <p:cSld>
+    <p:spTree>
+      <p:nvGrpSpPr>
+        <p:cNvPr id="1" name=""/>
+        <p:cNvGrpSpPr/>
+        <p:nvPr/>
+      </p:nvGrpSpPr>
+      <p:grpSpPr>
+        <a:xfrm>
+          <a:off x="0" y="0"/>
+          <a:ext cx="0" cy="0"/>
+          <a:chOff x="0" y="0"/>
+          <a:chExt cx="0" cy="0"/>
+        </a:xfrm>
+      </p:grpSpPr>
+      <p:pic>
+        <p:nvPicPr>
+          <p:cNvPr id="8" name="Picture 2" descr="Ed_DaSH">
+            <a:extLst>
+              <a:ext uri="{FF2B5EF4-FFF2-40B4-BE49-F238E27FC236}">
+                <a16:creationId xmlns:a16="http://schemas.microsoft.com/office/drawing/2014/main" id="{A783256F-E39E-4712-96B0-240BD611CFEB}"/>
+              </a:ext>
+            </a:extLst>
+          </p:cNvPr>
+          <p:cNvPicPr>
+            <a:picLocks noChangeAspect="1" noChangeArrowheads="1"/>
+          </p:cNvPicPr>
+          <p:nvPr/>
+        </p:nvPicPr>
+        <p:blipFill>
+          <a:blip r:embed="rId3" cstate="hqprint">
+            <a:extLst>
+              <a:ext uri="{28A0092B-C50C-407E-A947-70E740481C1C}">
+                <a14:useLocalDpi xmlns:a14="http://schemas.microsoft.com/office/drawing/2010/main" val="0"/>
+              </a:ext>
+            </a:extLst>
+          </a:blip>
+          <a:srcRect/>
+          <a:stretch>
+            <a:fillRect/>
+          </a:stretch>
+        </p:blipFill>
+        <p:spPr bwMode="auto">
+          <a:xfrm>
+            <a:off x="10820670" y="5458691"/>
+            <a:ext cx="1289214" cy="1325418"/>
+          </a:xfrm>
+          <a:prstGeom prst="rect">
+            <a:avLst/>
+          </a:prstGeom>
+          <a:noFill/>
+          <a:extLst>
+            <a:ext uri="{909E8E84-426E-40DD-AFC4-6F175D3DCCD1}">
+              <a14:hiddenFill xmlns:a14="http://schemas.microsoft.com/office/drawing/2010/main">
+                <a:solidFill>
+                  <a:srgbClr val="FFFFFF"/>
+                </a:solidFill>
+              </a14:hiddenFill>
+            </a:ext>
+          </a:extLst>
+        </p:spPr>
+      </p:pic>
+      <p:sp>
+        <p:nvSpPr>
+          <p:cNvPr id="7" name="TextBox 6">
+            <a:extLst>
+              <a:ext uri="{FF2B5EF4-FFF2-40B4-BE49-F238E27FC236}">
+                <a16:creationId xmlns:a16="http://schemas.microsoft.com/office/drawing/2014/main" id="{280516E9-127E-E84A-BC30-0B68C3087BD7}"/>
+              </a:ext>
+            </a:extLst>
+          </p:cNvPr>
+          <p:cNvSpPr txBox="1"/>
+          <p:nvPr/>
+        </p:nvSpPr>
+        <p:spPr>
+          <a:xfrm>
+            <a:off x="935641" y="1536174"/>
+            <a:ext cx="9993197" cy="1200329"/>
+          </a:xfrm>
+          <a:prstGeom prst="rect">
+            <a:avLst/>
+          </a:prstGeom>
+          <a:noFill/>
+        </p:spPr>
+        <p:txBody>
+          <a:bodyPr wrap="square">
+            <a:spAutoFit/>
+          </a:bodyPr>
+          <a:lstStyle/>
+          <a:p>
+            <a:pPr marL="342900" indent="-342900">
+              <a:buFont typeface="Arial" panose="020B0604020202020204" pitchFamily="34" charset="0"/>
+              <a:buChar char="•"/>
+            </a:pPr>
+            <a:r>
+              <a:rPr lang="en-GB" sz="2400" dirty="0">
+                <a:solidFill>
+                  <a:srgbClr val="0070C0"/>
+                </a:solidFill>
+                <a:latin typeface="Ubuntu"/>
+                <a:hlinkClick r:id="rId4"/>
+              </a:rPr>
+              <a:t>https://bioportal.bioontology.org/</a:t>
+            </a:r>
+            <a:endParaRPr lang="pl-PL" sz="2400" dirty="0">
+              <a:solidFill>
+                <a:srgbClr val="0070C0"/>
+              </a:solidFill>
+              <a:latin typeface="Ubuntu"/>
+            </a:endParaRPr>
+          </a:p>
+          <a:p>
+            <a:pPr marL="342900" indent="-342900">
+              <a:buFont typeface="Arial" panose="020B0604020202020204" pitchFamily="34" charset="0"/>
+              <a:buChar char="•"/>
+            </a:pPr>
+            <a:endParaRPr lang="pl-PL" sz="2400" dirty="0">
+              <a:solidFill>
+                <a:srgbClr val="0070C0"/>
+              </a:solidFill>
+              <a:latin typeface="Ubuntu"/>
+            </a:endParaRPr>
+          </a:p>
+          <a:p>
+            <a:pPr marL="342900" indent="-342900">
+              <a:buFont typeface="Arial" panose="020B0604020202020204" pitchFamily="34" charset="0"/>
+              <a:buChar char="•"/>
+            </a:pPr>
+            <a:r>
+              <a:rPr lang="pl-PL" sz="2400" dirty="0">
+                <a:solidFill>
+                  <a:srgbClr val="0070C0"/>
+                </a:solidFill>
+                <a:latin typeface="Ubuntu"/>
+              </a:rPr>
+              <a:t>https://obofoundry.org/	</a:t>
+            </a:r>
+            <a:endParaRPr lang="en-GB" sz="2400" b="0" i="0" dirty="0">
+              <a:solidFill>
+                <a:srgbClr val="0070C0"/>
+              </a:solidFill>
+              <a:effectLst/>
+              <a:latin typeface="Ubuntu"/>
+            </a:endParaRPr>
+          </a:p>
+        </p:txBody>
+      </p:sp>
+      <p:sp>
+        <p:nvSpPr>
+          <p:cNvPr id="5" name="Title 1">
+            <a:extLst>
+              <a:ext uri="{FF2B5EF4-FFF2-40B4-BE49-F238E27FC236}">
+                <a16:creationId xmlns:a16="http://schemas.microsoft.com/office/drawing/2014/main" id="{4DAC7CA0-DE31-4F47-83A2-26A827DD1E6B}"/>
+              </a:ext>
+            </a:extLst>
+          </p:cNvPr>
+          <p:cNvSpPr>
+            <a:spLocks noGrp="1"/>
+          </p:cNvSpPr>
+          <p:nvPr>
+            <p:ph type="title"/>
+          </p:nvPr>
+        </p:nvSpPr>
+        <p:spPr>
+          <a:xfrm>
+            <a:off x="838200" y="365125"/>
+            <a:ext cx="10515600" cy="1325563"/>
+          </a:xfrm>
+        </p:spPr>
+        <p:txBody>
+          <a:bodyPr>
+            <a:normAutofit/>
+          </a:bodyPr>
+          <a:lstStyle/>
+          <a:p>
+            <a:r>
+              <a:rPr lang="pl-PL" dirty="0" err="1"/>
+              <a:t>Where</a:t>
+            </a:r>
+            <a:r>
+              <a:rPr lang="pl-PL" dirty="0"/>
+              <a:t> to </a:t>
+            </a:r>
+            <a:r>
+              <a:rPr lang="pl-PL" dirty="0" err="1"/>
+              <a:t>find</a:t>
+            </a:r>
+            <a:r>
+              <a:rPr lang="pl-PL" dirty="0"/>
+              <a:t> </a:t>
+            </a:r>
+            <a:r>
+              <a:rPr lang="pl-PL" dirty="0" err="1"/>
+              <a:t>terms</a:t>
+            </a:r>
+            <a:r>
+              <a:rPr lang="pl-PL" dirty="0"/>
+              <a:t> / </a:t>
+            </a:r>
+            <a:r>
+              <a:rPr lang="pl-PL" dirty="0" err="1"/>
+              <a:t>ontolgies</a:t>
+            </a:r>
+            <a:endParaRPr lang="en-GB" dirty="0"/>
+          </a:p>
+        </p:txBody>
+      </p:sp>
+    </p:spTree>
+    <p:extLst>
+      <p:ext uri="{BB962C8B-B14F-4D97-AF65-F5344CB8AC3E}">
+        <p14:creationId xmlns:p14="http://schemas.microsoft.com/office/powerpoint/2010/main" val="566365549"/>
+      </p:ext>
+    </p:extLst>
+  </p:cSld>
+  <p:clrMapOvr>
+    <a:masterClrMapping/>
+  </p:clrMapOvr>
+</p:sld>
+</file>
+
 <file path=ppt/slides/slide2.xml><?xml version="1.0" encoding="utf-8"?>
 <p:sld xmlns:a="http://schemas.openxmlformats.org/drawingml/2006/main" xmlns:r="http://schemas.openxmlformats.org/officeDocument/2006/relationships" xmlns:p="http://schemas.openxmlformats.org/presentationml/2006/main">
   <p:cSld>
@@ -12608,6 +12916,113 @@
     <p:extLst>
       <p:ext uri="{BB962C8B-B14F-4D97-AF65-F5344CB8AC3E}">
         <p14:creationId xmlns:p14="http://schemas.microsoft.com/office/powerpoint/2010/main" val="1138010981"/>
+      </p:ext>
+    </p:extLst>
+  </p:cSld>
+  <p:clrMapOvr>
+    <a:masterClrMapping/>
+  </p:clrMapOvr>
+</p:sld>
+</file>
+
+<file path=ppt/slides/slide20.xml><?xml version="1.0" encoding="utf-8"?>
+<p:sld xmlns:a="http://schemas.openxmlformats.org/drawingml/2006/main" xmlns:r="http://schemas.openxmlformats.org/officeDocument/2006/relationships" xmlns:p="http://schemas.openxmlformats.org/presentationml/2006/main">
+  <p:cSld>
+    <p:spTree>
+      <p:nvGrpSpPr>
+        <p:cNvPr id="1" name=""/>
+        <p:cNvGrpSpPr/>
+        <p:nvPr/>
+      </p:nvGrpSpPr>
+      <p:grpSpPr>
+        <a:xfrm>
+          <a:off x="0" y="0"/>
+          <a:ext cx="0" cy="0"/>
+          <a:chOff x="0" y="0"/>
+          <a:chExt cx="0" cy="0"/>
+        </a:xfrm>
+      </p:grpSpPr>
+      <p:sp>
+        <p:nvSpPr>
+          <p:cNvPr id="2" name="Tytuł 1">
+            <a:extLst>
+              <a:ext uri="{FF2B5EF4-FFF2-40B4-BE49-F238E27FC236}">
+                <a16:creationId xmlns:a16="http://schemas.microsoft.com/office/drawing/2014/main" id="{DF9EF55B-F2C3-4DE0-8F1D-822911934317}"/>
+              </a:ext>
+            </a:extLst>
+          </p:cNvPr>
+          <p:cNvSpPr>
+            <a:spLocks noGrp="1"/>
+          </p:cNvSpPr>
+          <p:nvPr>
+            <p:ph type="title"/>
+          </p:nvPr>
+        </p:nvSpPr>
+        <p:spPr/>
+        <p:txBody>
+          <a:bodyPr/>
+          <a:lstStyle/>
+          <a:p>
+            <a:endParaRPr lang="pl-PL"/>
+          </a:p>
+        </p:txBody>
+      </p:sp>
+      <p:sp>
+        <p:nvSpPr>
+          <p:cNvPr id="3" name="Symbol zastępczy zawartości 2">
+            <a:extLst>
+              <a:ext uri="{FF2B5EF4-FFF2-40B4-BE49-F238E27FC236}">
+                <a16:creationId xmlns:a16="http://schemas.microsoft.com/office/drawing/2014/main" id="{A49C1393-B213-44D0-B305-3B796B020BDF}"/>
+              </a:ext>
+            </a:extLst>
+          </p:cNvPr>
+          <p:cNvSpPr>
+            <a:spLocks noGrp="1"/>
+          </p:cNvSpPr>
+          <p:nvPr>
+            <p:ph idx="1"/>
+          </p:nvPr>
+        </p:nvSpPr>
+        <p:spPr/>
+        <p:txBody>
+          <a:bodyPr/>
+          <a:lstStyle/>
+          <a:p>
+            <a:r>
+              <a:rPr lang="pl-PL" dirty="0">
+                <a:hlinkClick r:id="rId2"/>
+              </a:rPr>
+              <a:t>https://bioportal.bioontology.org/ontologies/SO?p=classes&amp;conceptid=http://purl.obolibrary.org/obo/SO_0000167#details</a:t>
+            </a:r>
+            <a:endParaRPr lang="pl-PL" dirty="0"/>
+          </a:p>
+          <a:p>
+            <a:endParaRPr lang="pl-PL" dirty="0"/>
+          </a:p>
+          <a:p>
+            <a:r>
+              <a:rPr lang="pl-PL" dirty="0">
+                <a:hlinkClick r:id="rId3"/>
+              </a:rPr>
+              <a:t>https://bioportal.bioontology.org/ontologies/ZFA/?p=classes&amp;conceptid=http%3A%2F%2Fpurl.obolibrary.org%2Fobo%2FZFA_0001109#details</a:t>
+            </a:r>
+            <a:endParaRPr lang="pl-PL" dirty="0"/>
+          </a:p>
+          <a:p>
+            <a:endParaRPr lang="pl-PL" dirty="0"/>
+          </a:p>
+          <a:p>
+            <a:r>
+              <a:rPr lang="pl-PL" dirty="0"/>
+              <a:t>https://bioportal.bioontology.org/ontologies/CL?p=classes&amp;conceptid=CL:0000129#details</a:t>
+            </a:r>
+          </a:p>
+        </p:txBody>
+      </p:sp>
+    </p:spTree>
+    <p:extLst>
+      <p:ext uri="{BB962C8B-B14F-4D97-AF65-F5344CB8AC3E}">
+        <p14:creationId xmlns:p14="http://schemas.microsoft.com/office/powerpoint/2010/main" val="428657191"/>
       </p:ext>
     </p:extLst>
   </p:cSld>

</xml_diff>

<commit_message>
Adding content about ontologies
</commit_message>
<xml_diff>
--- a/instructors/06-being-precise_v2.0.pptx
+++ b/instructors/06-being-precise_v2.0.pptx
@@ -5,7 +5,7 @@
     <p:sldMasterId id="2147483648" r:id="rId1"/>
   </p:sldMasterIdLst>
   <p:notesMasterIdLst>
-    <p:notesMasterId r:id="rId22"/>
+    <p:notesMasterId r:id="rId24"/>
   </p:notesMasterIdLst>
   <p:sldIdLst>
     <p:sldId id="256" r:id="rId2"/>
@@ -28,6 +28,8 @@
     <p:sldId id="289" r:id="rId19"/>
     <p:sldId id="291" r:id="rId20"/>
     <p:sldId id="292" r:id="rId21"/>
+    <p:sldId id="293" r:id="rId22"/>
+    <p:sldId id="294" r:id="rId23"/>
   </p:sldIdLst>
   <p:sldSz cx="12192000" cy="6858000"/>
   <p:notesSz cx="6858000" cy="9144000"/>
@@ -1168,6 +1170,13 @@
         </dgm:presLayoutVars>
       </dgm:prSet>
       <dgm:spPr/>
+      <dgm:t>
+        <a:bodyPr/>
+        <a:lstStyle/>
+        <a:p>
+          <a:endParaRPr lang="en-US"/>
+        </a:p>
+      </dgm:t>
     </dgm:pt>
     <dgm:pt modelId="{743B3204-A4FE-534C-9E27-38201FAEDAAA}" type="pres">
       <dgm:prSet presAssocID="{FCEBBBF3-8A31-4470-85D3-4170AEC96BEA}" presName="parentText" presStyleLbl="node1" presStyleIdx="0" presStyleCnt="1" custScaleY="41392">
@@ -1177,6 +1186,13 @@
         </dgm:presLayoutVars>
       </dgm:prSet>
       <dgm:spPr/>
+      <dgm:t>
+        <a:bodyPr/>
+        <a:lstStyle/>
+        <a:p>
+          <a:endParaRPr lang="en-US"/>
+        </a:p>
+      </dgm:t>
     </dgm:pt>
     <dgm:pt modelId="{C41B53A0-0F1C-4A43-B22E-2EC069477606}" type="pres">
       <dgm:prSet presAssocID="{FCEBBBF3-8A31-4470-85D3-4170AEC96BEA}" presName="childText" presStyleLbl="revTx" presStyleIdx="0" presStyleCnt="1">
@@ -1185,20 +1201,27 @@
         </dgm:presLayoutVars>
       </dgm:prSet>
       <dgm:spPr/>
+      <dgm:t>
+        <a:bodyPr/>
+        <a:lstStyle/>
+        <a:p>
+          <a:endParaRPr lang="en-US"/>
+        </a:p>
+      </dgm:t>
     </dgm:pt>
   </dgm:ptLst>
   <dgm:cxnLst>
+    <dgm:cxn modelId="{3ED94D2B-AE65-4031-AD0C-03AA349D94B1}" srcId="{FCEBBBF3-8A31-4470-85D3-4170AEC96BEA}" destId="{6CFA366C-FAF6-4B8C-8528-D9E43EEEE4BE}" srcOrd="2" destOrd="0" parTransId="{86A0D73E-6BCB-4541-9ACC-7F10C4DC0765}" sibTransId="{5037A0B3-3E33-4923-897D-AF9A8530E79C}"/>
+    <dgm:cxn modelId="{785350EB-84B7-9B42-BF8D-5155C42D6C0A}" type="presOf" srcId="{CDAD5B99-2F9C-468D-8CB8-3F40B8A87CAD}" destId="{413C05D6-A700-8D41-85C5-19FA87734BFB}" srcOrd="0" destOrd="0" presId="urn:microsoft.com/office/officeart/2005/8/layout/vList2"/>
+    <dgm:cxn modelId="{6E519078-C0B5-4D94-B1C1-72C3DD17D5D3}" srcId="{FCEBBBF3-8A31-4470-85D3-4170AEC96BEA}" destId="{DFC09763-14A8-4D35-8D86-B5B87C6229E3}" srcOrd="3" destOrd="0" parTransId="{FAA53CDB-FD42-43B3-96FF-06AA48EC6AEC}" sibTransId="{ADC56536-F9D1-4133-BA3B-E0DA44397277}"/>
+    <dgm:cxn modelId="{F58E342F-A9C2-8045-B57C-A4E48DB2FF91}" type="presOf" srcId="{D9ED73D0-E0C0-4604-9132-D5FFB00A9ADD}" destId="{C41B53A0-0F1C-4A43-B22E-2EC069477606}" srcOrd="0" destOrd="0" presId="urn:microsoft.com/office/officeart/2005/8/layout/vList2"/>
+    <dgm:cxn modelId="{0BB24126-0B8B-F048-AD24-A7FC9C6E8916}" type="presOf" srcId="{B63A3314-D22F-4F16-A44C-D6D3AE53C8E4}" destId="{C41B53A0-0F1C-4A43-B22E-2EC069477606}" srcOrd="0" destOrd="1" presId="urn:microsoft.com/office/officeart/2005/8/layout/vList2"/>
+    <dgm:cxn modelId="{02F91AA3-E467-4414-9C8C-55635ADEAF33}" srcId="{CDAD5B99-2F9C-468D-8CB8-3F40B8A87CAD}" destId="{FCEBBBF3-8A31-4470-85D3-4170AEC96BEA}" srcOrd="0" destOrd="0" parTransId="{3B799CDA-E9BB-42FF-9252-99517ADCD9AA}" sibTransId="{89E19568-94A8-47ED-9AC7-DAA3D33B5717}"/>
+    <dgm:cxn modelId="{1183C61D-0CBD-4C4E-A66E-41CEE79A8505}" type="presOf" srcId="{FCEBBBF3-8A31-4470-85D3-4170AEC96BEA}" destId="{743B3204-A4FE-534C-9E27-38201FAEDAAA}" srcOrd="0" destOrd="0" presId="urn:microsoft.com/office/officeart/2005/8/layout/vList2"/>
+    <dgm:cxn modelId="{4AC03F90-DBA2-4BAC-A5DB-5933B1B1E549}" srcId="{FCEBBBF3-8A31-4470-85D3-4170AEC96BEA}" destId="{D9ED73D0-E0C0-4604-9132-D5FFB00A9ADD}" srcOrd="0" destOrd="0" parTransId="{913E0A6E-7813-4923-B7D4-A26CDDF60CEC}" sibTransId="{F73A81D5-31BD-4E16-ACC5-FB74F89AA670}"/>
+    <dgm:cxn modelId="{1332678A-69EB-2A42-8A5E-28E799390132}" type="presOf" srcId="{6CFA366C-FAF6-4B8C-8528-D9E43EEEE4BE}" destId="{C41B53A0-0F1C-4A43-B22E-2EC069477606}" srcOrd="0" destOrd="2" presId="urn:microsoft.com/office/officeart/2005/8/layout/vList2"/>
+    <dgm:cxn modelId="{7848D0DC-C6C1-4140-BBBF-1DEBF681C239}" type="presOf" srcId="{DFC09763-14A8-4D35-8D86-B5B87C6229E3}" destId="{C41B53A0-0F1C-4A43-B22E-2EC069477606}" srcOrd="0" destOrd="3" presId="urn:microsoft.com/office/officeart/2005/8/layout/vList2"/>
     <dgm:cxn modelId="{4BE36009-2142-4FA2-B21D-2233AF9BFD4F}" srcId="{FCEBBBF3-8A31-4470-85D3-4170AEC96BEA}" destId="{B63A3314-D22F-4F16-A44C-D6D3AE53C8E4}" srcOrd="1" destOrd="0" parTransId="{C7D70768-5E79-4723-B70F-8BCE23C6A6CB}" sibTransId="{476F5209-69BE-48D6-9234-8AA5C2006700}"/>
-    <dgm:cxn modelId="{1183C61D-0CBD-4C4E-A66E-41CEE79A8505}" type="presOf" srcId="{FCEBBBF3-8A31-4470-85D3-4170AEC96BEA}" destId="{743B3204-A4FE-534C-9E27-38201FAEDAAA}" srcOrd="0" destOrd="0" presId="urn:microsoft.com/office/officeart/2005/8/layout/vList2"/>
-    <dgm:cxn modelId="{0BB24126-0B8B-F048-AD24-A7FC9C6E8916}" type="presOf" srcId="{B63A3314-D22F-4F16-A44C-D6D3AE53C8E4}" destId="{C41B53A0-0F1C-4A43-B22E-2EC069477606}" srcOrd="0" destOrd="1" presId="urn:microsoft.com/office/officeart/2005/8/layout/vList2"/>
-    <dgm:cxn modelId="{3ED94D2B-AE65-4031-AD0C-03AA349D94B1}" srcId="{FCEBBBF3-8A31-4470-85D3-4170AEC96BEA}" destId="{6CFA366C-FAF6-4B8C-8528-D9E43EEEE4BE}" srcOrd="2" destOrd="0" parTransId="{86A0D73E-6BCB-4541-9ACC-7F10C4DC0765}" sibTransId="{5037A0B3-3E33-4923-897D-AF9A8530E79C}"/>
-    <dgm:cxn modelId="{F58E342F-A9C2-8045-B57C-A4E48DB2FF91}" type="presOf" srcId="{D9ED73D0-E0C0-4604-9132-D5FFB00A9ADD}" destId="{C41B53A0-0F1C-4A43-B22E-2EC069477606}" srcOrd="0" destOrd="0" presId="urn:microsoft.com/office/officeart/2005/8/layout/vList2"/>
-    <dgm:cxn modelId="{6E519078-C0B5-4D94-B1C1-72C3DD17D5D3}" srcId="{FCEBBBF3-8A31-4470-85D3-4170AEC96BEA}" destId="{DFC09763-14A8-4D35-8D86-B5B87C6229E3}" srcOrd="3" destOrd="0" parTransId="{FAA53CDB-FD42-43B3-96FF-06AA48EC6AEC}" sibTransId="{ADC56536-F9D1-4133-BA3B-E0DA44397277}"/>
-    <dgm:cxn modelId="{1332678A-69EB-2A42-8A5E-28E799390132}" type="presOf" srcId="{6CFA366C-FAF6-4B8C-8528-D9E43EEEE4BE}" destId="{C41B53A0-0F1C-4A43-B22E-2EC069477606}" srcOrd="0" destOrd="2" presId="urn:microsoft.com/office/officeart/2005/8/layout/vList2"/>
-    <dgm:cxn modelId="{4AC03F90-DBA2-4BAC-A5DB-5933B1B1E549}" srcId="{FCEBBBF3-8A31-4470-85D3-4170AEC96BEA}" destId="{D9ED73D0-E0C0-4604-9132-D5FFB00A9ADD}" srcOrd="0" destOrd="0" parTransId="{913E0A6E-7813-4923-B7D4-A26CDDF60CEC}" sibTransId="{F73A81D5-31BD-4E16-ACC5-FB74F89AA670}"/>
-    <dgm:cxn modelId="{02F91AA3-E467-4414-9C8C-55635ADEAF33}" srcId="{CDAD5B99-2F9C-468D-8CB8-3F40B8A87CAD}" destId="{FCEBBBF3-8A31-4470-85D3-4170AEC96BEA}" srcOrd="0" destOrd="0" parTransId="{3B799CDA-E9BB-42FF-9252-99517ADCD9AA}" sibTransId="{89E19568-94A8-47ED-9AC7-DAA3D33B5717}"/>
-    <dgm:cxn modelId="{7848D0DC-C6C1-4140-BBBF-1DEBF681C239}" type="presOf" srcId="{DFC09763-14A8-4D35-8D86-B5B87C6229E3}" destId="{C41B53A0-0F1C-4A43-B22E-2EC069477606}" srcOrd="0" destOrd="3" presId="urn:microsoft.com/office/officeart/2005/8/layout/vList2"/>
-    <dgm:cxn modelId="{785350EB-84B7-9B42-BF8D-5155C42D6C0A}" type="presOf" srcId="{CDAD5B99-2F9C-468D-8CB8-3F40B8A87CAD}" destId="{413C05D6-A700-8D41-85C5-19FA87734BFB}" srcOrd="0" destOrd="0" presId="urn:microsoft.com/office/officeart/2005/8/layout/vList2"/>
     <dgm:cxn modelId="{A5263A0E-0085-1F4D-847E-058F4E407D95}" type="presParOf" srcId="{413C05D6-A700-8D41-85C5-19FA87734BFB}" destId="{743B3204-A4FE-534C-9E27-38201FAEDAAA}" srcOrd="0" destOrd="0" presId="urn:microsoft.com/office/officeart/2005/8/layout/vList2"/>
     <dgm:cxn modelId="{4F1878DF-3678-B441-A3C0-E8685C8535B0}" type="presParOf" srcId="{413C05D6-A700-8D41-85C5-19FA87734BFB}" destId="{C41B53A0-0F1C-4A43-B22E-2EC069477606}" srcOrd="1" destOrd="0" presId="urn:microsoft.com/office/officeart/2005/8/layout/vList2"/>
   </dgm:cxnLst>
@@ -1275,7 +1298,7 @@
         </a:bodyPr>
         <a:lstStyle/>
         <a:p>
-          <a:pPr marL="0" lvl="0" indent="0" algn="l" defTabSz="1066800">
+          <a:pPr lvl="0" algn="l" defTabSz="1066800">
             <a:lnSpc>
               <a:spcPct val="90000"/>
             </a:lnSpc>
@@ -1285,7 +1308,6 @@
             <a:spcAft>
               <a:spcPct val="35000"/>
             </a:spcAft>
-            <a:buNone/>
           </a:pPr>
           <a:r>
             <a:rPr lang="en-GB" sz="2400" kern="1200" dirty="0">
@@ -1354,7 +1376,7 @@
             <a:spcAft>
               <a:spcPct val="20000"/>
             </a:spcAft>
-            <a:buChar char="•"/>
+            <a:buChar char="••"/>
           </a:pPr>
           <a:r>
             <a:rPr lang="en-GB" sz="2400" kern="1200" dirty="0">
@@ -1381,7 +1403,7 @@
             <a:spcAft>
               <a:spcPct val="20000"/>
             </a:spcAft>
-            <a:buChar char="•"/>
+            <a:buChar char="••"/>
           </a:pPr>
           <a:r>
             <a:rPr lang="en-GB" sz="2400" kern="1200" dirty="0">
@@ -1408,7 +1430,7 @@
             <a:spcAft>
               <a:spcPct val="20000"/>
             </a:spcAft>
-            <a:buChar char="•"/>
+            <a:buChar char="••"/>
           </a:pPr>
           <a:r>
             <a:rPr lang="en-GB" sz="2400" kern="1200" dirty="0">
@@ -1435,7 +1457,7 @@
             <a:spcAft>
               <a:spcPct val="20000"/>
             </a:spcAft>
-            <a:buChar char="•"/>
+            <a:buChar char="••"/>
           </a:pPr>
           <a:r>
             <a:rPr lang="en-GB" sz="2400" kern="1200" dirty="0">
@@ -2744,7 +2766,7 @@
           <a:p>
             <a:fld id="{FA57F229-43F7-7D47-A634-B37BDFAB7535}" type="datetimeFigureOut">
               <a:rPr lang="en-GB" smtClean="0"/>
-              <a:t>16/02/2022</a:t>
+              <a:t>15/01/2023</a:t>
             </a:fld>
             <a:endParaRPr lang="en-GB"/>
           </a:p>
@@ -5545,7 +5567,7 @@
             <a:fld id="{5913FB77-D8DB-4AB9-8EA5-EE8C3B57A5E1}" type="datetimeFigureOut">
               <a:rPr lang="en-GB" smtClean="0"/>
               <a:pPr/>
-              <a:t>16/02/2022</a:t>
+              <a:t>15/01/2023</a:t>
             </a:fld>
             <a:endParaRPr lang="en-GB"/>
           </a:p>
@@ -5809,7 +5831,7 @@
           <a:p>
             <a:fld id="{5913FB77-D8DB-4AB9-8EA5-EE8C3B57A5E1}" type="datetimeFigureOut">
               <a:rPr lang="en-GB" smtClean="0"/>
-              <a:t>16/02/2022</a:t>
+              <a:t>15/01/2023</a:t>
             </a:fld>
             <a:endParaRPr lang="en-GB"/>
           </a:p>
@@ -6019,7 +6041,7 @@
           <a:p>
             <a:fld id="{5913FB77-D8DB-4AB9-8EA5-EE8C3B57A5E1}" type="datetimeFigureOut">
               <a:rPr lang="en-GB" smtClean="0"/>
-              <a:t>16/02/2022</a:t>
+              <a:t>15/01/2023</a:t>
             </a:fld>
             <a:endParaRPr lang="en-GB"/>
           </a:p>
@@ -6219,7 +6241,7 @@
           <a:p>
             <a:fld id="{5913FB77-D8DB-4AB9-8EA5-EE8C3B57A5E1}" type="datetimeFigureOut">
               <a:rPr lang="en-GB" smtClean="0"/>
-              <a:t>16/02/2022</a:t>
+              <a:t>15/01/2023</a:t>
             </a:fld>
             <a:endParaRPr lang="en-GB"/>
           </a:p>
@@ -6495,7 +6517,7 @@
           <a:p>
             <a:fld id="{5913FB77-D8DB-4AB9-8EA5-EE8C3B57A5E1}" type="datetimeFigureOut">
               <a:rPr lang="en-GB" smtClean="0"/>
-              <a:t>16/02/2022</a:t>
+              <a:t>15/01/2023</a:t>
             </a:fld>
             <a:endParaRPr lang="en-GB"/>
           </a:p>
@@ -6763,7 +6785,7 @@
           <a:p>
             <a:fld id="{5913FB77-D8DB-4AB9-8EA5-EE8C3B57A5E1}" type="datetimeFigureOut">
               <a:rPr lang="en-GB" smtClean="0"/>
-              <a:t>16/02/2022</a:t>
+              <a:t>15/01/2023</a:t>
             </a:fld>
             <a:endParaRPr lang="en-GB"/>
           </a:p>
@@ -7178,7 +7200,7 @@
           <a:p>
             <a:fld id="{5913FB77-D8DB-4AB9-8EA5-EE8C3B57A5E1}" type="datetimeFigureOut">
               <a:rPr lang="en-GB" smtClean="0"/>
-              <a:t>16/02/2022</a:t>
+              <a:t>15/01/2023</a:t>
             </a:fld>
             <a:endParaRPr lang="en-GB"/>
           </a:p>
@@ -7320,7 +7342,7 @@
           <a:p>
             <a:fld id="{5913FB77-D8DB-4AB9-8EA5-EE8C3B57A5E1}" type="datetimeFigureOut">
               <a:rPr lang="en-GB" smtClean="0"/>
-              <a:t>16/02/2022</a:t>
+              <a:t>15/01/2023</a:t>
             </a:fld>
             <a:endParaRPr lang="en-GB"/>
           </a:p>
@@ -7433,7 +7455,7 @@
           <a:p>
             <a:fld id="{5913FB77-D8DB-4AB9-8EA5-EE8C3B57A5E1}" type="datetimeFigureOut">
               <a:rPr lang="en-GB" smtClean="0"/>
-              <a:t>16/02/2022</a:t>
+              <a:t>15/01/2023</a:t>
             </a:fld>
             <a:endParaRPr lang="en-GB"/>
           </a:p>
@@ -7746,7 +7768,7 @@
           <a:p>
             <a:fld id="{5913FB77-D8DB-4AB9-8EA5-EE8C3B57A5E1}" type="datetimeFigureOut">
               <a:rPr lang="en-GB" smtClean="0"/>
-              <a:t>16/02/2022</a:t>
+              <a:t>15/01/2023</a:t>
             </a:fld>
             <a:endParaRPr lang="en-GB"/>
           </a:p>
@@ -8035,7 +8057,7 @@
           <a:p>
             <a:fld id="{5913FB77-D8DB-4AB9-8EA5-EE8C3B57A5E1}" type="datetimeFigureOut">
               <a:rPr lang="en-GB" smtClean="0"/>
-              <a:t>16/02/2022</a:t>
+              <a:t>15/01/2023</a:t>
             </a:fld>
             <a:endParaRPr lang="en-GB"/>
           </a:p>
@@ -8277,7 +8299,7 @@
             <a:fld id="{5913FB77-D8DB-4AB9-8EA5-EE8C3B57A5E1}" type="datetimeFigureOut">
               <a:rPr lang="en-GB" smtClean="0"/>
               <a:pPr/>
-              <a:t>16/02/2022</a:t>
+              <a:t>15/01/2023</a:t>
             </a:fld>
             <a:endParaRPr lang="en-GB"/>
           </a:p>
@@ -8740,54 +8762,6 @@
       </p:grpSpPr>
       <p:sp>
         <p:nvSpPr>
-          <p:cNvPr id="10" name="TextBox 9">
-            <a:extLst>
-              <a:ext uri="{FF2B5EF4-FFF2-40B4-BE49-F238E27FC236}">
-                <a16:creationId xmlns:a16="http://schemas.microsoft.com/office/drawing/2014/main" id="{C194C698-09DE-9542-826D-9901B37FBED8}"/>
-              </a:ext>
-            </a:extLst>
-          </p:cNvPr>
-          <p:cNvSpPr txBox="1"/>
-          <p:nvPr/>
-        </p:nvSpPr>
-        <p:spPr>
-          <a:xfrm>
-            <a:off x="1470868" y="5070039"/>
-            <a:ext cx="6987331" cy="369332"/>
-          </a:xfrm>
-          <a:prstGeom prst="rect">
-            <a:avLst/>
-          </a:prstGeom>
-          <a:noFill/>
-        </p:spPr>
-        <p:txBody>
-          <a:bodyPr wrap="square">
-            <a:spAutoFit/>
-          </a:bodyPr>
-          <a:lstStyle/>
-          <a:p>
-            <a:r>
-              <a:rPr lang="en-GB" dirty="0"/>
-              <a:t>Open https://</a:t>
-            </a:r>
-            <a:r>
-              <a:rPr lang="en-GB" dirty="0" err="1"/>
-              <a:t>pad.carpentries.org</a:t>
-            </a:r>
-            <a:r>
-              <a:rPr lang="en-GB" dirty="0"/>
-              <a:t>/2021-10-19_ed-dash_fair-bio-practice</a:t>
-            </a:r>
-            <a:endParaRPr lang="en-GB" dirty="0">
-              <a:highlight>
-                <a:srgbClr val="FFFF00"/>
-              </a:highlight>
-            </a:endParaRPr>
-          </a:p>
-        </p:txBody>
-      </p:sp>
-      <p:sp>
-        <p:nvSpPr>
           <p:cNvPr id="12" name="Title 1">
             <a:extLst>
               <a:ext uri="{FF2B5EF4-FFF2-40B4-BE49-F238E27FC236}">
@@ -8816,52 +8790,6 @@
               <a:rPr lang="en-GB" dirty="0"/>
               <a:t>Being precise</a:t>
             </a:r>
-          </a:p>
-        </p:txBody>
-      </p:sp>
-      <p:sp>
-        <p:nvSpPr>
-          <p:cNvPr id="11" name="Arrow: Down 7">
-            <a:extLst>
-              <a:ext uri="{FF2B5EF4-FFF2-40B4-BE49-F238E27FC236}">
-                <a16:creationId xmlns:a16="http://schemas.microsoft.com/office/drawing/2014/main" id="{47106452-7319-7241-9D95-DB012DCA9085}"/>
-              </a:ext>
-            </a:extLst>
-          </p:cNvPr>
-          <p:cNvSpPr/>
-          <p:nvPr/>
-        </p:nvSpPr>
-        <p:spPr>
-          <a:xfrm rot="16200000">
-            <a:off x="789103" y="4944312"/>
-            <a:ext cx="469783" cy="620786"/>
-          </a:xfrm>
-          <a:prstGeom prst="downArrow">
-            <a:avLst/>
-          </a:prstGeom>
-        </p:spPr>
-        <p:style>
-          <a:lnRef idx="2">
-            <a:schemeClr val="accent1">
-              <a:shade val="50000"/>
-            </a:schemeClr>
-          </a:lnRef>
-          <a:fillRef idx="1">
-            <a:schemeClr val="accent1"/>
-          </a:fillRef>
-          <a:effectRef idx="0">
-            <a:schemeClr val="accent1"/>
-          </a:effectRef>
-          <a:fontRef idx="minor">
-            <a:schemeClr val="lt1"/>
-          </a:fontRef>
-        </p:style>
-        <p:txBody>
-          <a:bodyPr rtlCol="0" anchor="ctr"/>
-          <a:lstStyle/>
-          <a:p>
-            <a:pPr algn="ctr"/>
-            <a:endParaRPr lang="en-GB"/>
           </a:p>
         </p:txBody>
       </p:sp>
@@ -12783,31 +12711,11 @@
           <a:lstStyle/>
           <a:p>
             <a:r>
-              <a:rPr lang="pl-PL" dirty="0" err="1"/>
-              <a:t>Where</a:t>
-            </a:r>
-            <a:r>
-              <a:rPr lang="pl-PL" dirty="0"/>
-              <a:t> to </a:t>
-            </a:r>
-            <a:r>
-              <a:rPr lang="pl-PL" dirty="0" err="1"/>
-              <a:t>find</a:t>
-            </a:r>
-            <a:r>
-              <a:rPr lang="pl-PL" dirty="0"/>
-              <a:t> </a:t>
-            </a:r>
-            <a:r>
-              <a:rPr lang="pl-PL" dirty="0" err="1"/>
-              <a:t>terms</a:t>
-            </a:r>
-            <a:r>
-              <a:rPr lang="pl-PL" dirty="0"/>
-              <a:t> / </a:t>
-            </a:r>
-            <a:r>
-              <a:rPr lang="pl-PL" dirty="0" err="1"/>
+              <a:rPr lang="en-GB" dirty="0" smtClean="0"/>
+              <a:t>Where to find terms / </a:t>
+            </a:r>
+            <a:r>
+              <a:rPr lang="en-GB" dirty="0" err="1" smtClean="0"/>
               <a:t>ontolgies</a:t>
             </a:r>
             <a:endParaRPr lang="en-GB" dirty="0"/>
@@ -12963,7 +12871,11 @@
           <a:bodyPr/>
           <a:lstStyle/>
           <a:p>
-            <a:endParaRPr lang="pl-PL"/>
+            <a:r>
+              <a:rPr lang="pl-PL" dirty="0" smtClean="0"/>
+              <a:t>Explore ontolgies (code-along)</a:t>
+            </a:r>
+            <a:endParaRPr lang="pl-PL" dirty="0"/>
           </a:p>
         </p:txBody>
       </p:sp>
@@ -13023,6 +12935,229 @@
     <p:extLst>
       <p:ext uri="{BB962C8B-B14F-4D97-AF65-F5344CB8AC3E}">
         <p14:creationId xmlns:p14="http://schemas.microsoft.com/office/powerpoint/2010/main" val="428657191"/>
+      </p:ext>
+    </p:extLst>
+  </p:cSld>
+  <p:clrMapOvr>
+    <a:masterClrMapping/>
+  </p:clrMapOvr>
+</p:sld>
+</file>
+
+<file path=ppt/slides/slide21.xml><?xml version="1.0" encoding="utf-8"?>
+<p:sld xmlns:a="http://schemas.openxmlformats.org/drawingml/2006/main" xmlns:r="http://schemas.openxmlformats.org/officeDocument/2006/relationships" xmlns:p="http://schemas.openxmlformats.org/presentationml/2006/main">
+  <p:cSld>
+    <p:spTree>
+      <p:nvGrpSpPr>
+        <p:cNvPr id="1" name=""/>
+        <p:cNvGrpSpPr/>
+        <p:nvPr/>
+      </p:nvGrpSpPr>
+      <p:grpSpPr>
+        <a:xfrm>
+          <a:off x="0" y="0"/>
+          <a:ext cx="0" cy="0"/>
+          <a:chOff x="0" y="0"/>
+          <a:chExt cx="0" cy="0"/>
+        </a:xfrm>
+      </p:grpSpPr>
+      <p:sp>
+        <p:nvSpPr>
+          <p:cNvPr id="2" name="Tytuł 1">
+            <a:extLst>
+              <a:ext uri="{FF2B5EF4-FFF2-40B4-BE49-F238E27FC236}">
+                <a16:creationId xmlns:a16="http://schemas.microsoft.com/office/drawing/2014/main" id="{DF9EF55B-F2C3-4DE0-8F1D-822911934317}"/>
+              </a:ext>
+            </a:extLst>
+          </p:cNvPr>
+          <p:cNvSpPr>
+            <a:spLocks noGrp="1"/>
+          </p:cNvSpPr>
+          <p:nvPr>
+            <p:ph type="title"/>
+          </p:nvPr>
+        </p:nvSpPr>
+        <p:spPr/>
+        <p:txBody>
+          <a:bodyPr/>
+          <a:lstStyle/>
+          <a:p>
+            <a:r>
+              <a:rPr lang="pl-PL" dirty="0" smtClean="0"/>
+              <a:t>Ontology test</a:t>
+            </a:r>
+            <a:endParaRPr lang="pl-PL" dirty="0"/>
+          </a:p>
+        </p:txBody>
+      </p:sp>
+      <p:sp>
+        <p:nvSpPr>
+          <p:cNvPr id="3" name="Symbol zastępczy zawartości 2">
+            <a:extLst>
+              <a:ext uri="{FF2B5EF4-FFF2-40B4-BE49-F238E27FC236}">
+                <a16:creationId xmlns:a16="http://schemas.microsoft.com/office/drawing/2014/main" id="{A49C1393-B213-44D0-B305-3B796B020BDF}"/>
+              </a:ext>
+            </a:extLst>
+          </p:cNvPr>
+          <p:cNvSpPr>
+            <a:spLocks noGrp="1"/>
+          </p:cNvSpPr>
+          <p:nvPr>
+            <p:ph idx="1"/>
+          </p:nvPr>
+        </p:nvSpPr>
+        <p:spPr/>
+        <p:txBody>
+          <a:bodyPr/>
+          <a:lstStyle/>
+          <a:p>
+            <a:endParaRPr lang="pl-PL" dirty="0"/>
+          </a:p>
+        </p:txBody>
+      </p:sp>
+    </p:spTree>
+    <p:extLst>
+      <p:ext uri="{BB962C8B-B14F-4D97-AF65-F5344CB8AC3E}">
+        <p14:creationId xmlns:p14="http://schemas.microsoft.com/office/powerpoint/2010/main" val="2873898585"/>
+      </p:ext>
+    </p:extLst>
+  </p:cSld>
+  <p:clrMapOvr>
+    <a:masterClrMapping/>
+  </p:clrMapOvr>
+</p:sld>
+</file>
+
+<file path=ppt/slides/slide22.xml><?xml version="1.0" encoding="utf-8"?>
+<p:sld xmlns:a="http://schemas.openxmlformats.org/drawingml/2006/main" xmlns:r="http://schemas.openxmlformats.org/officeDocument/2006/relationships" xmlns:p="http://schemas.openxmlformats.org/presentationml/2006/main">
+  <p:cSld>
+    <p:spTree>
+      <p:nvGrpSpPr>
+        <p:cNvPr id="1" name=""/>
+        <p:cNvGrpSpPr/>
+        <p:nvPr/>
+      </p:nvGrpSpPr>
+      <p:grpSpPr>
+        <a:xfrm>
+          <a:off x="0" y="0"/>
+          <a:ext cx="0" cy="0"/>
+          <a:chOff x="0" y="0"/>
+          <a:chExt cx="0" cy="0"/>
+        </a:xfrm>
+      </p:grpSpPr>
+      <p:sp>
+        <p:nvSpPr>
+          <p:cNvPr id="2" name="Tytuł 1">
+            <a:extLst>
+              <a:ext uri="{FF2B5EF4-FFF2-40B4-BE49-F238E27FC236}">
+                <a16:creationId xmlns:a16="http://schemas.microsoft.com/office/drawing/2014/main" id="{DF9EF55B-F2C3-4DE0-8F1D-822911934317}"/>
+              </a:ext>
+            </a:extLst>
+          </p:cNvPr>
+          <p:cNvSpPr>
+            <a:spLocks noGrp="1"/>
+          </p:cNvSpPr>
+          <p:nvPr>
+            <p:ph type="title"/>
+          </p:nvPr>
+        </p:nvSpPr>
+        <p:spPr/>
+        <p:txBody>
+          <a:bodyPr/>
+          <a:lstStyle/>
+          <a:p>
+            <a:r>
+              <a:rPr lang="pl-PL" dirty="0" smtClean="0"/>
+              <a:t>Credits</a:t>
+            </a:r>
+            <a:endParaRPr lang="pl-PL" dirty="0"/>
+          </a:p>
+        </p:txBody>
+      </p:sp>
+      <p:sp>
+        <p:nvSpPr>
+          <p:cNvPr id="3" name="Symbol zastępczy zawartości 2">
+            <a:extLst>
+              <a:ext uri="{FF2B5EF4-FFF2-40B4-BE49-F238E27FC236}">
+                <a16:creationId xmlns:a16="http://schemas.microsoft.com/office/drawing/2014/main" id="{A49C1393-B213-44D0-B305-3B796B020BDF}"/>
+              </a:ext>
+            </a:extLst>
+          </p:cNvPr>
+          <p:cNvSpPr>
+            <a:spLocks noGrp="1"/>
+          </p:cNvSpPr>
+          <p:nvPr>
+            <p:ph idx="1"/>
+          </p:nvPr>
+        </p:nvSpPr>
+        <p:spPr/>
+        <p:txBody>
+          <a:bodyPr/>
+          <a:lstStyle/>
+          <a:p>
+            <a:endParaRPr lang="pl-PL" dirty="0" smtClean="0"/>
+          </a:p>
+          <a:p>
+            <a:pPr marL="0" indent="0">
+              <a:buNone/>
+            </a:pPr>
+            <a:r>
+              <a:rPr lang="en-GB" dirty="0"/>
+              <a:t>BD2K Open Educational Resources: BDK14 Ontologies </a:t>
+            </a:r>
+            <a:r>
+              <a:rPr lang="en-GB" dirty="0" smtClean="0"/>
+              <a:t>101</a:t>
+            </a:r>
+            <a:r>
+              <a:rPr lang="pl-PL" dirty="0" smtClean="0"/>
+              <a:t>,</a:t>
+            </a:r>
+          </a:p>
+          <a:p>
+            <a:pPr marL="0" indent="0">
+              <a:buNone/>
+            </a:pPr>
+            <a:r>
+              <a:rPr lang="en-GB" dirty="0" smtClean="0"/>
+              <a:t>Nicole </a:t>
+            </a:r>
+            <a:r>
+              <a:rPr lang="en-GB" dirty="0" err="1" smtClean="0"/>
+              <a:t>Vasilevsky</a:t>
+            </a:r>
+            <a:r>
+              <a:rPr lang="pl-PL" dirty="0" smtClean="0"/>
+              <a:t>, </a:t>
+            </a:r>
+          </a:p>
+          <a:p>
+            <a:pPr marL="0" indent="0">
+              <a:buNone/>
+            </a:pPr>
+            <a:r>
+              <a:rPr lang="en-GB" u="sng" dirty="0" smtClean="0"/>
+              <a:t>https</a:t>
+            </a:r>
+            <a:r>
+              <a:rPr lang="en-GB" u="sng" dirty="0"/>
+              <a:t>://</a:t>
+            </a:r>
+            <a:r>
+              <a:rPr lang="en-GB" u="sng" dirty="0" smtClean="0"/>
+              <a:t>github.com/OHSUBD2K/BDK14-Ontologies-101</a:t>
+            </a:r>
+            <a:endParaRPr lang="en-GB" dirty="0"/>
+          </a:p>
+          <a:p>
+            <a:endParaRPr lang="pl-PL" dirty="0"/>
+          </a:p>
+        </p:txBody>
+      </p:sp>
+    </p:spTree>
+    <p:extLst>
+      <p:ext uri="{BB962C8B-B14F-4D97-AF65-F5344CB8AC3E}">
+        <p14:creationId xmlns:p14="http://schemas.microsoft.com/office/powerpoint/2010/main" val="1996850996"/>
       </p:ext>
     </p:extLst>
   </p:cSld>

</xml_diff>